<commit_message>
does this fix it
</commit_message>
<xml_diff>
--- a/midterm_presentation.pptx
+++ b/midterm_presentation.pptx
@@ -522,6 +522,90 @@
           <a:bodyPr/>
           <a:lstStyle/>
           <a:p>
+            <a:endParaRPr lang="en-US" dirty="0"/>
+          </a:p>
+        </p:txBody>
+      </p:sp>
+      <p:sp>
+        <p:nvSpPr>
+          <p:cNvPr id="4" name="Slide Number Placeholder 3"/>
+          <p:cNvSpPr>
+            <a:spLocks noGrp="1"/>
+          </p:cNvSpPr>
+          <p:nvPr>
+            <p:ph type="sldNum" sz="quarter" idx="10"/>
+          </p:nvPr>
+        </p:nvSpPr>
+        <p:spPr/>
+        <p:txBody>
+          <a:bodyPr/>
+          <a:lstStyle/>
+          <a:p>
+            <a:fld id="{B722305B-3B16-C141-9D10-B33E0E704EC5}" type="slidenum">
+              <a:rPr lang="en-US" smtClean="0"/>
+              <a:t>1</a:t>
+            </a:fld>
+            <a:endParaRPr lang="en-US"/>
+          </a:p>
+        </p:txBody>
+      </p:sp>
+    </p:spTree>
+    <p:extLst>
+      <p:ext uri="{BB962C8B-B14F-4D97-AF65-F5344CB8AC3E}">
+        <p14:creationId xmlns:p14="http://schemas.microsoft.com/office/powerpoint/2010/main" val="1816065549"/>
+      </p:ext>
+    </p:extLst>
+  </p:cSld>
+  <p:clrMapOvr>
+    <a:masterClrMapping/>
+  </p:clrMapOvr>
+</p:notes>
+</file>
+
+<file path=ppt/notesSlides/notesSlide2.xml><?xml version="1.0" encoding="utf-8"?>
+<p:notes xmlns:a="http://schemas.openxmlformats.org/drawingml/2006/main" xmlns:r="http://schemas.openxmlformats.org/officeDocument/2006/relationships" xmlns:p="http://schemas.openxmlformats.org/presentationml/2006/main">
+  <p:cSld>
+    <p:spTree>
+      <p:nvGrpSpPr>
+        <p:cNvPr id="1" name=""/>
+        <p:cNvGrpSpPr/>
+        <p:nvPr/>
+      </p:nvGrpSpPr>
+      <p:grpSpPr>
+        <a:xfrm>
+          <a:off x="0" y="0"/>
+          <a:ext cx="0" cy="0"/>
+          <a:chOff x="0" y="0"/>
+          <a:chExt cx="0" cy="0"/>
+        </a:xfrm>
+      </p:grpSpPr>
+      <p:sp>
+        <p:nvSpPr>
+          <p:cNvPr id="2" name="Slide Image Placeholder 1"/>
+          <p:cNvSpPr>
+            <a:spLocks noGrp="1" noRot="1" noChangeAspect="1"/>
+          </p:cNvSpPr>
+          <p:nvPr>
+            <p:ph type="sldImg"/>
+          </p:nvPr>
+        </p:nvSpPr>
+        <p:spPr/>
+      </p:sp>
+      <p:sp>
+        <p:nvSpPr>
+          <p:cNvPr id="3" name="Notes Placeholder 2"/>
+          <p:cNvSpPr>
+            <a:spLocks noGrp="1"/>
+          </p:cNvSpPr>
+          <p:nvPr>
+            <p:ph type="body" idx="1"/>
+          </p:nvPr>
+        </p:nvSpPr>
+        <p:spPr/>
+        <p:txBody>
+          <a:bodyPr/>
+          <a:lstStyle/>
+          <a:p>
             <a:r>
               <a:rPr lang="en-US" dirty="0" err="1"/>
               <a:t>Arash</a:t>
@@ -569,7 +653,7 @@
 </p:notes>
 </file>
 
-<file path=ppt/notesSlides/notesSlide2.xml><?xml version="1.0" encoding="utf-8"?>
+<file path=ppt/notesSlides/notesSlide3.xml><?xml version="1.0" encoding="utf-8"?>
 <p:notes xmlns:a="http://schemas.openxmlformats.org/drawingml/2006/main" xmlns:r="http://schemas.openxmlformats.org/officeDocument/2006/relationships" xmlns:p="http://schemas.openxmlformats.org/presentationml/2006/main">
   <p:cSld>
     <p:spTree>
@@ -682,7 +766,7 @@
           <p:cNvPr id="2" name="Title 1">
             <a:extLst>
               <a:ext uri="{FF2B5EF4-FFF2-40B4-BE49-F238E27FC236}">
-                <a16:creationId xmlns:a16="http://schemas.microsoft.com/office/drawing/2014/main" xmlns="" id="{9514A341-69ED-D243-A5BB-D69A08A2FAB9}"/>
+                <a16:creationId xmlns:a16="http://schemas.microsoft.com/office/drawing/2014/main" id="{9514A341-69ED-D243-A5BB-D69A08A2FAB9}"/>
               </a:ext>
             </a:extLst>
           </p:cNvPr>
@@ -719,7 +803,7 @@
           <p:cNvPr id="3" name="Subtitle 2">
             <a:extLst>
               <a:ext uri="{FF2B5EF4-FFF2-40B4-BE49-F238E27FC236}">
-                <a16:creationId xmlns:a16="http://schemas.microsoft.com/office/drawing/2014/main" xmlns="" id="{731088D5-9375-494B-AB28-C0E75E715692}"/>
+                <a16:creationId xmlns:a16="http://schemas.microsoft.com/office/drawing/2014/main" id="{731088D5-9375-494B-AB28-C0E75E715692}"/>
               </a:ext>
             </a:extLst>
           </p:cNvPr>
@@ -789,7 +873,7 @@
           <p:cNvPr id="4" name="Date Placeholder 3">
             <a:extLst>
               <a:ext uri="{FF2B5EF4-FFF2-40B4-BE49-F238E27FC236}">
-                <a16:creationId xmlns:a16="http://schemas.microsoft.com/office/drawing/2014/main" xmlns="" id="{8892F842-31FF-6147-9392-A775EA2935F3}"/>
+                <a16:creationId xmlns:a16="http://schemas.microsoft.com/office/drawing/2014/main" id="{8892F842-31FF-6147-9392-A775EA2935F3}"/>
               </a:ext>
             </a:extLst>
           </p:cNvPr>
@@ -818,7 +902,7 @@
           <p:cNvPr id="5" name="Footer Placeholder 4">
             <a:extLst>
               <a:ext uri="{FF2B5EF4-FFF2-40B4-BE49-F238E27FC236}">
-                <a16:creationId xmlns:a16="http://schemas.microsoft.com/office/drawing/2014/main" xmlns="" id="{6E530C11-C6F5-CD4B-9A63-CF4661BC01C1}"/>
+                <a16:creationId xmlns:a16="http://schemas.microsoft.com/office/drawing/2014/main" id="{6E530C11-C6F5-CD4B-9A63-CF4661BC01C1}"/>
               </a:ext>
             </a:extLst>
           </p:cNvPr>
@@ -843,7 +927,7 @@
           <p:cNvPr id="6" name="Slide Number Placeholder 5">
             <a:extLst>
               <a:ext uri="{FF2B5EF4-FFF2-40B4-BE49-F238E27FC236}">
-                <a16:creationId xmlns:a16="http://schemas.microsoft.com/office/drawing/2014/main" xmlns="" id="{41F82781-0884-BB4C-8F43-B6331D184175}"/>
+                <a16:creationId xmlns:a16="http://schemas.microsoft.com/office/drawing/2014/main" id="{41F82781-0884-BB4C-8F43-B6331D184175}"/>
               </a:ext>
             </a:extLst>
           </p:cNvPr>
@@ -902,7 +986,7 @@
           <p:cNvPr id="2" name="Title 1">
             <a:extLst>
               <a:ext uri="{FF2B5EF4-FFF2-40B4-BE49-F238E27FC236}">
-                <a16:creationId xmlns:a16="http://schemas.microsoft.com/office/drawing/2014/main" xmlns="" id="{52DC6E93-7D37-D846-8E12-2407481497D4}"/>
+                <a16:creationId xmlns:a16="http://schemas.microsoft.com/office/drawing/2014/main" id="{52DC6E93-7D37-D846-8E12-2407481497D4}"/>
               </a:ext>
             </a:extLst>
           </p:cNvPr>
@@ -930,7 +1014,7 @@
           <p:cNvPr id="3" name="Vertical Text Placeholder 2">
             <a:extLst>
               <a:ext uri="{FF2B5EF4-FFF2-40B4-BE49-F238E27FC236}">
-                <a16:creationId xmlns:a16="http://schemas.microsoft.com/office/drawing/2014/main" xmlns="" id="{800A96E4-D12D-1241-914B-A275D740532A}"/>
+                <a16:creationId xmlns:a16="http://schemas.microsoft.com/office/drawing/2014/main" id="{800A96E4-D12D-1241-914B-A275D740532A}"/>
               </a:ext>
             </a:extLst>
           </p:cNvPr>
@@ -987,7 +1071,7 @@
           <p:cNvPr id="4" name="Date Placeholder 3">
             <a:extLst>
               <a:ext uri="{FF2B5EF4-FFF2-40B4-BE49-F238E27FC236}">
-                <a16:creationId xmlns:a16="http://schemas.microsoft.com/office/drawing/2014/main" xmlns="" id="{95B2D362-25D9-7A4A-A76B-9917DBA216F0}"/>
+                <a16:creationId xmlns:a16="http://schemas.microsoft.com/office/drawing/2014/main" id="{95B2D362-25D9-7A4A-A76B-9917DBA216F0}"/>
               </a:ext>
             </a:extLst>
           </p:cNvPr>
@@ -1016,7 +1100,7 @@
           <p:cNvPr id="5" name="Footer Placeholder 4">
             <a:extLst>
               <a:ext uri="{FF2B5EF4-FFF2-40B4-BE49-F238E27FC236}">
-                <a16:creationId xmlns:a16="http://schemas.microsoft.com/office/drawing/2014/main" xmlns="" id="{39BD6234-876E-1C4B-AD64-5DC3425C3558}"/>
+                <a16:creationId xmlns:a16="http://schemas.microsoft.com/office/drawing/2014/main" id="{39BD6234-876E-1C4B-AD64-5DC3425C3558}"/>
               </a:ext>
             </a:extLst>
           </p:cNvPr>
@@ -1041,7 +1125,7 @@
           <p:cNvPr id="6" name="Slide Number Placeholder 5">
             <a:extLst>
               <a:ext uri="{FF2B5EF4-FFF2-40B4-BE49-F238E27FC236}">
-                <a16:creationId xmlns:a16="http://schemas.microsoft.com/office/drawing/2014/main" xmlns="" id="{9CECE56A-C32E-4E47-8979-B6B101E523FE}"/>
+                <a16:creationId xmlns:a16="http://schemas.microsoft.com/office/drawing/2014/main" id="{9CECE56A-C32E-4E47-8979-B6B101E523FE}"/>
               </a:ext>
             </a:extLst>
           </p:cNvPr>
@@ -1100,7 +1184,7 @@
           <p:cNvPr id="2" name="Vertical Title 1">
             <a:extLst>
               <a:ext uri="{FF2B5EF4-FFF2-40B4-BE49-F238E27FC236}">
-                <a16:creationId xmlns:a16="http://schemas.microsoft.com/office/drawing/2014/main" xmlns="" id="{47199A6F-730A-5146-AE4E-85181386019A}"/>
+                <a16:creationId xmlns:a16="http://schemas.microsoft.com/office/drawing/2014/main" id="{47199A6F-730A-5146-AE4E-85181386019A}"/>
               </a:ext>
             </a:extLst>
           </p:cNvPr>
@@ -1133,7 +1217,7 @@
           <p:cNvPr id="3" name="Vertical Text Placeholder 2">
             <a:extLst>
               <a:ext uri="{FF2B5EF4-FFF2-40B4-BE49-F238E27FC236}">
-                <a16:creationId xmlns:a16="http://schemas.microsoft.com/office/drawing/2014/main" xmlns="" id="{D024795D-3721-A740-8FEE-425C4D4969E6}"/>
+                <a16:creationId xmlns:a16="http://schemas.microsoft.com/office/drawing/2014/main" id="{D024795D-3721-A740-8FEE-425C4D4969E6}"/>
               </a:ext>
             </a:extLst>
           </p:cNvPr>
@@ -1195,7 +1279,7 @@
           <p:cNvPr id="4" name="Date Placeholder 3">
             <a:extLst>
               <a:ext uri="{FF2B5EF4-FFF2-40B4-BE49-F238E27FC236}">
-                <a16:creationId xmlns:a16="http://schemas.microsoft.com/office/drawing/2014/main" xmlns="" id="{4FA1E2ED-2612-8B40-8DD7-0C99AF14E6C1}"/>
+                <a16:creationId xmlns:a16="http://schemas.microsoft.com/office/drawing/2014/main" id="{4FA1E2ED-2612-8B40-8DD7-0C99AF14E6C1}"/>
               </a:ext>
             </a:extLst>
           </p:cNvPr>
@@ -1224,7 +1308,7 @@
           <p:cNvPr id="5" name="Footer Placeholder 4">
             <a:extLst>
               <a:ext uri="{FF2B5EF4-FFF2-40B4-BE49-F238E27FC236}">
-                <a16:creationId xmlns:a16="http://schemas.microsoft.com/office/drawing/2014/main" xmlns="" id="{283FB754-7C96-9846-8180-DFFB00EE9579}"/>
+                <a16:creationId xmlns:a16="http://schemas.microsoft.com/office/drawing/2014/main" id="{283FB754-7C96-9846-8180-DFFB00EE9579}"/>
               </a:ext>
             </a:extLst>
           </p:cNvPr>
@@ -1249,7 +1333,7 @@
           <p:cNvPr id="6" name="Slide Number Placeholder 5">
             <a:extLst>
               <a:ext uri="{FF2B5EF4-FFF2-40B4-BE49-F238E27FC236}">
-                <a16:creationId xmlns:a16="http://schemas.microsoft.com/office/drawing/2014/main" xmlns="" id="{D31D0FF8-6C1F-9E40-B424-B2F0223C1053}"/>
+                <a16:creationId xmlns:a16="http://schemas.microsoft.com/office/drawing/2014/main" id="{D31D0FF8-6C1F-9E40-B424-B2F0223C1053}"/>
               </a:ext>
             </a:extLst>
           </p:cNvPr>
@@ -1308,7 +1392,7 @@
           <p:cNvPr id="2" name="Title 1">
             <a:extLst>
               <a:ext uri="{FF2B5EF4-FFF2-40B4-BE49-F238E27FC236}">
-                <a16:creationId xmlns:a16="http://schemas.microsoft.com/office/drawing/2014/main" xmlns="" id="{A52527F9-C314-664B-9A0A-94E07F7A2538}"/>
+                <a16:creationId xmlns:a16="http://schemas.microsoft.com/office/drawing/2014/main" id="{A52527F9-C314-664B-9A0A-94E07F7A2538}"/>
               </a:ext>
             </a:extLst>
           </p:cNvPr>
@@ -1336,7 +1420,7 @@
           <p:cNvPr id="3" name="Content Placeholder 2">
             <a:extLst>
               <a:ext uri="{FF2B5EF4-FFF2-40B4-BE49-F238E27FC236}">
-                <a16:creationId xmlns:a16="http://schemas.microsoft.com/office/drawing/2014/main" xmlns="" id="{D3113FAD-EE1C-4C4A-96EC-F110260F44BD}"/>
+                <a16:creationId xmlns:a16="http://schemas.microsoft.com/office/drawing/2014/main" id="{D3113FAD-EE1C-4C4A-96EC-F110260F44BD}"/>
               </a:ext>
             </a:extLst>
           </p:cNvPr>
@@ -1393,7 +1477,7 @@
           <p:cNvPr id="4" name="Date Placeholder 3">
             <a:extLst>
               <a:ext uri="{FF2B5EF4-FFF2-40B4-BE49-F238E27FC236}">
-                <a16:creationId xmlns:a16="http://schemas.microsoft.com/office/drawing/2014/main" xmlns="" id="{3CF56791-06EE-0D4D-A66B-EF1791829745}"/>
+                <a16:creationId xmlns:a16="http://schemas.microsoft.com/office/drawing/2014/main" id="{3CF56791-06EE-0D4D-A66B-EF1791829745}"/>
               </a:ext>
             </a:extLst>
           </p:cNvPr>
@@ -1422,7 +1506,7 @@
           <p:cNvPr id="5" name="Footer Placeholder 4">
             <a:extLst>
               <a:ext uri="{FF2B5EF4-FFF2-40B4-BE49-F238E27FC236}">
-                <a16:creationId xmlns:a16="http://schemas.microsoft.com/office/drawing/2014/main" xmlns="" id="{F4BF55C5-8418-C440-BE9F-B8120E0270B3}"/>
+                <a16:creationId xmlns:a16="http://schemas.microsoft.com/office/drawing/2014/main" id="{F4BF55C5-8418-C440-BE9F-B8120E0270B3}"/>
               </a:ext>
             </a:extLst>
           </p:cNvPr>
@@ -1447,7 +1531,7 @@
           <p:cNvPr id="6" name="Slide Number Placeholder 5">
             <a:extLst>
               <a:ext uri="{FF2B5EF4-FFF2-40B4-BE49-F238E27FC236}">
-                <a16:creationId xmlns:a16="http://schemas.microsoft.com/office/drawing/2014/main" xmlns="" id="{0C093C2C-0399-2F42-BC62-A8A3A52DFBEF}"/>
+                <a16:creationId xmlns:a16="http://schemas.microsoft.com/office/drawing/2014/main" id="{0C093C2C-0399-2F42-BC62-A8A3A52DFBEF}"/>
               </a:ext>
             </a:extLst>
           </p:cNvPr>
@@ -1506,7 +1590,7 @@
           <p:cNvPr id="2" name="Title 1">
             <a:extLst>
               <a:ext uri="{FF2B5EF4-FFF2-40B4-BE49-F238E27FC236}">
-                <a16:creationId xmlns:a16="http://schemas.microsoft.com/office/drawing/2014/main" xmlns="" id="{46AE4F74-C04B-6646-966D-8CE135029F67}"/>
+                <a16:creationId xmlns:a16="http://schemas.microsoft.com/office/drawing/2014/main" id="{46AE4F74-C04B-6646-966D-8CE135029F67}"/>
               </a:ext>
             </a:extLst>
           </p:cNvPr>
@@ -1543,7 +1627,7 @@
           <p:cNvPr id="3" name="Text Placeholder 2">
             <a:extLst>
               <a:ext uri="{FF2B5EF4-FFF2-40B4-BE49-F238E27FC236}">
-                <a16:creationId xmlns:a16="http://schemas.microsoft.com/office/drawing/2014/main" xmlns="" id="{0E51A314-D793-7042-AAC9-95434A6220FF}"/>
+                <a16:creationId xmlns:a16="http://schemas.microsoft.com/office/drawing/2014/main" id="{0E51A314-D793-7042-AAC9-95434A6220FF}"/>
               </a:ext>
             </a:extLst>
           </p:cNvPr>
@@ -1668,7 +1752,7 @@
           <p:cNvPr id="4" name="Date Placeholder 3">
             <a:extLst>
               <a:ext uri="{FF2B5EF4-FFF2-40B4-BE49-F238E27FC236}">
-                <a16:creationId xmlns:a16="http://schemas.microsoft.com/office/drawing/2014/main" xmlns="" id="{5A29F1A9-4259-0146-8779-3E9783F752A5}"/>
+                <a16:creationId xmlns:a16="http://schemas.microsoft.com/office/drawing/2014/main" id="{5A29F1A9-4259-0146-8779-3E9783F752A5}"/>
               </a:ext>
             </a:extLst>
           </p:cNvPr>
@@ -1697,7 +1781,7 @@
           <p:cNvPr id="5" name="Footer Placeholder 4">
             <a:extLst>
               <a:ext uri="{FF2B5EF4-FFF2-40B4-BE49-F238E27FC236}">
-                <a16:creationId xmlns:a16="http://schemas.microsoft.com/office/drawing/2014/main" xmlns="" id="{AA504BB6-C0C0-D642-86F1-049824923D9C}"/>
+                <a16:creationId xmlns:a16="http://schemas.microsoft.com/office/drawing/2014/main" id="{AA504BB6-C0C0-D642-86F1-049824923D9C}"/>
               </a:ext>
             </a:extLst>
           </p:cNvPr>
@@ -1722,7 +1806,7 @@
           <p:cNvPr id="6" name="Slide Number Placeholder 5">
             <a:extLst>
               <a:ext uri="{FF2B5EF4-FFF2-40B4-BE49-F238E27FC236}">
-                <a16:creationId xmlns:a16="http://schemas.microsoft.com/office/drawing/2014/main" xmlns="" id="{A1478E59-1975-4547-B211-B596040E9ADE}"/>
+                <a16:creationId xmlns:a16="http://schemas.microsoft.com/office/drawing/2014/main" id="{A1478E59-1975-4547-B211-B596040E9ADE}"/>
               </a:ext>
             </a:extLst>
           </p:cNvPr>
@@ -1781,7 +1865,7 @@
           <p:cNvPr id="2" name="Title 1">
             <a:extLst>
               <a:ext uri="{FF2B5EF4-FFF2-40B4-BE49-F238E27FC236}">
-                <a16:creationId xmlns:a16="http://schemas.microsoft.com/office/drawing/2014/main" xmlns="" id="{A0A2C9C6-146F-AC4D-B5C9-2248C41580B0}"/>
+                <a16:creationId xmlns:a16="http://schemas.microsoft.com/office/drawing/2014/main" id="{A0A2C9C6-146F-AC4D-B5C9-2248C41580B0}"/>
               </a:ext>
             </a:extLst>
           </p:cNvPr>
@@ -1809,7 +1893,7 @@
           <p:cNvPr id="3" name="Content Placeholder 2">
             <a:extLst>
               <a:ext uri="{FF2B5EF4-FFF2-40B4-BE49-F238E27FC236}">
-                <a16:creationId xmlns:a16="http://schemas.microsoft.com/office/drawing/2014/main" xmlns="" id="{E85010A7-DE99-5342-AFAD-3DBE37866E52}"/>
+                <a16:creationId xmlns:a16="http://schemas.microsoft.com/office/drawing/2014/main" id="{E85010A7-DE99-5342-AFAD-3DBE37866E52}"/>
               </a:ext>
             </a:extLst>
           </p:cNvPr>
@@ -1871,7 +1955,7 @@
           <p:cNvPr id="4" name="Content Placeholder 3">
             <a:extLst>
               <a:ext uri="{FF2B5EF4-FFF2-40B4-BE49-F238E27FC236}">
-                <a16:creationId xmlns:a16="http://schemas.microsoft.com/office/drawing/2014/main" xmlns="" id="{55AC3DC5-E0AE-AC4C-8D5A-EC7EDFF99BE0}"/>
+                <a16:creationId xmlns:a16="http://schemas.microsoft.com/office/drawing/2014/main" id="{55AC3DC5-E0AE-AC4C-8D5A-EC7EDFF99BE0}"/>
               </a:ext>
             </a:extLst>
           </p:cNvPr>
@@ -1933,7 +2017,7 @@
           <p:cNvPr id="5" name="Date Placeholder 4">
             <a:extLst>
               <a:ext uri="{FF2B5EF4-FFF2-40B4-BE49-F238E27FC236}">
-                <a16:creationId xmlns:a16="http://schemas.microsoft.com/office/drawing/2014/main" xmlns="" id="{895DDA00-DB5D-0540-931A-850557903CEA}"/>
+                <a16:creationId xmlns:a16="http://schemas.microsoft.com/office/drawing/2014/main" id="{895DDA00-DB5D-0540-931A-850557903CEA}"/>
               </a:ext>
             </a:extLst>
           </p:cNvPr>
@@ -1962,7 +2046,7 @@
           <p:cNvPr id="6" name="Footer Placeholder 5">
             <a:extLst>
               <a:ext uri="{FF2B5EF4-FFF2-40B4-BE49-F238E27FC236}">
-                <a16:creationId xmlns:a16="http://schemas.microsoft.com/office/drawing/2014/main" xmlns="" id="{DD031AA0-4E9A-D345-BB79-CAA2C8E5F853}"/>
+                <a16:creationId xmlns:a16="http://schemas.microsoft.com/office/drawing/2014/main" id="{DD031AA0-4E9A-D345-BB79-CAA2C8E5F853}"/>
               </a:ext>
             </a:extLst>
           </p:cNvPr>
@@ -1987,7 +2071,7 @@
           <p:cNvPr id="7" name="Slide Number Placeholder 6">
             <a:extLst>
               <a:ext uri="{FF2B5EF4-FFF2-40B4-BE49-F238E27FC236}">
-                <a16:creationId xmlns:a16="http://schemas.microsoft.com/office/drawing/2014/main" xmlns="" id="{A05671C0-F387-CD48-9548-3D11AF2A2D62}"/>
+                <a16:creationId xmlns:a16="http://schemas.microsoft.com/office/drawing/2014/main" id="{A05671C0-F387-CD48-9548-3D11AF2A2D62}"/>
               </a:ext>
             </a:extLst>
           </p:cNvPr>
@@ -2046,7 +2130,7 @@
           <p:cNvPr id="2" name="Title 1">
             <a:extLst>
               <a:ext uri="{FF2B5EF4-FFF2-40B4-BE49-F238E27FC236}">
-                <a16:creationId xmlns:a16="http://schemas.microsoft.com/office/drawing/2014/main" xmlns="" id="{52C7E19E-33BB-0A40-898E-21C4D8B75257}"/>
+                <a16:creationId xmlns:a16="http://schemas.microsoft.com/office/drawing/2014/main" id="{52C7E19E-33BB-0A40-898E-21C4D8B75257}"/>
               </a:ext>
             </a:extLst>
           </p:cNvPr>
@@ -2079,7 +2163,7 @@
           <p:cNvPr id="3" name="Text Placeholder 2">
             <a:extLst>
               <a:ext uri="{FF2B5EF4-FFF2-40B4-BE49-F238E27FC236}">
-                <a16:creationId xmlns:a16="http://schemas.microsoft.com/office/drawing/2014/main" xmlns="" id="{F2C45494-BDE1-204B-8971-46B3CD32A0A3}"/>
+                <a16:creationId xmlns:a16="http://schemas.microsoft.com/office/drawing/2014/main" id="{F2C45494-BDE1-204B-8971-46B3CD32A0A3}"/>
               </a:ext>
             </a:extLst>
           </p:cNvPr>
@@ -2150,7 +2234,7 @@
           <p:cNvPr id="4" name="Content Placeholder 3">
             <a:extLst>
               <a:ext uri="{FF2B5EF4-FFF2-40B4-BE49-F238E27FC236}">
-                <a16:creationId xmlns:a16="http://schemas.microsoft.com/office/drawing/2014/main" xmlns="" id="{F7A71837-ADCE-5540-B0C6-56D108B40738}"/>
+                <a16:creationId xmlns:a16="http://schemas.microsoft.com/office/drawing/2014/main" id="{F7A71837-ADCE-5540-B0C6-56D108B40738}"/>
               </a:ext>
             </a:extLst>
           </p:cNvPr>
@@ -2212,7 +2296,7 @@
           <p:cNvPr id="5" name="Text Placeholder 4">
             <a:extLst>
               <a:ext uri="{FF2B5EF4-FFF2-40B4-BE49-F238E27FC236}">
-                <a16:creationId xmlns:a16="http://schemas.microsoft.com/office/drawing/2014/main" xmlns="" id="{A759F03B-0228-2F41-A14D-2546EE9BA806}"/>
+                <a16:creationId xmlns:a16="http://schemas.microsoft.com/office/drawing/2014/main" id="{A759F03B-0228-2F41-A14D-2546EE9BA806}"/>
               </a:ext>
             </a:extLst>
           </p:cNvPr>
@@ -2283,7 +2367,7 @@
           <p:cNvPr id="6" name="Content Placeholder 5">
             <a:extLst>
               <a:ext uri="{FF2B5EF4-FFF2-40B4-BE49-F238E27FC236}">
-                <a16:creationId xmlns:a16="http://schemas.microsoft.com/office/drawing/2014/main" xmlns="" id="{C6F5956D-FB22-2B4A-9329-A84FD2CE3CDE}"/>
+                <a16:creationId xmlns:a16="http://schemas.microsoft.com/office/drawing/2014/main" id="{C6F5956D-FB22-2B4A-9329-A84FD2CE3CDE}"/>
               </a:ext>
             </a:extLst>
           </p:cNvPr>
@@ -2345,7 +2429,7 @@
           <p:cNvPr id="7" name="Date Placeholder 6">
             <a:extLst>
               <a:ext uri="{FF2B5EF4-FFF2-40B4-BE49-F238E27FC236}">
-                <a16:creationId xmlns:a16="http://schemas.microsoft.com/office/drawing/2014/main" xmlns="" id="{36852D22-52BE-C24C-A899-BD0B675C2519}"/>
+                <a16:creationId xmlns:a16="http://schemas.microsoft.com/office/drawing/2014/main" id="{36852D22-52BE-C24C-A899-BD0B675C2519}"/>
               </a:ext>
             </a:extLst>
           </p:cNvPr>
@@ -2374,7 +2458,7 @@
           <p:cNvPr id="8" name="Footer Placeholder 7">
             <a:extLst>
               <a:ext uri="{FF2B5EF4-FFF2-40B4-BE49-F238E27FC236}">
-                <a16:creationId xmlns:a16="http://schemas.microsoft.com/office/drawing/2014/main" xmlns="" id="{4DD51E40-6853-054E-B5AE-67E0A6E77D76}"/>
+                <a16:creationId xmlns:a16="http://schemas.microsoft.com/office/drawing/2014/main" id="{4DD51E40-6853-054E-B5AE-67E0A6E77D76}"/>
               </a:ext>
             </a:extLst>
           </p:cNvPr>
@@ -2399,7 +2483,7 @@
           <p:cNvPr id="9" name="Slide Number Placeholder 8">
             <a:extLst>
               <a:ext uri="{FF2B5EF4-FFF2-40B4-BE49-F238E27FC236}">
-                <a16:creationId xmlns:a16="http://schemas.microsoft.com/office/drawing/2014/main" xmlns="" id="{6C3D38B8-3FD8-7C43-A59F-2AC8EAF716AE}"/>
+                <a16:creationId xmlns:a16="http://schemas.microsoft.com/office/drawing/2014/main" id="{6C3D38B8-3FD8-7C43-A59F-2AC8EAF716AE}"/>
               </a:ext>
             </a:extLst>
           </p:cNvPr>
@@ -2458,7 +2542,7 @@
           <p:cNvPr id="2" name="Title 1">
             <a:extLst>
               <a:ext uri="{FF2B5EF4-FFF2-40B4-BE49-F238E27FC236}">
-                <a16:creationId xmlns:a16="http://schemas.microsoft.com/office/drawing/2014/main" xmlns="" id="{BC0F2119-3587-934F-A1F3-141C18E80571}"/>
+                <a16:creationId xmlns:a16="http://schemas.microsoft.com/office/drawing/2014/main" id="{BC0F2119-3587-934F-A1F3-141C18E80571}"/>
               </a:ext>
             </a:extLst>
           </p:cNvPr>
@@ -2486,7 +2570,7 @@
           <p:cNvPr id="3" name="Date Placeholder 2">
             <a:extLst>
               <a:ext uri="{FF2B5EF4-FFF2-40B4-BE49-F238E27FC236}">
-                <a16:creationId xmlns:a16="http://schemas.microsoft.com/office/drawing/2014/main" xmlns="" id="{48B2ADF1-6077-8F4D-A5B9-EAA77AEE8050}"/>
+                <a16:creationId xmlns:a16="http://schemas.microsoft.com/office/drawing/2014/main" id="{48B2ADF1-6077-8F4D-A5B9-EAA77AEE8050}"/>
               </a:ext>
             </a:extLst>
           </p:cNvPr>
@@ -2515,7 +2599,7 @@
           <p:cNvPr id="4" name="Footer Placeholder 3">
             <a:extLst>
               <a:ext uri="{FF2B5EF4-FFF2-40B4-BE49-F238E27FC236}">
-                <a16:creationId xmlns:a16="http://schemas.microsoft.com/office/drawing/2014/main" xmlns="" id="{438B4D55-647C-E14F-9867-EC595AB77EFC}"/>
+                <a16:creationId xmlns:a16="http://schemas.microsoft.com/office/drawing/2014/main" id="{438B4D55-647C-E14F-9867-EC595AB77EFC}"/>
               </a:ext>
             </a:extLst>
           </p:cNvPr>
@@ -2540,7 +2624,7 @@
           <p:cNvPr id="5" name="Slide Number Placeholder 4">
             <a:extLst>
               <a:ext uri="{FF2B5EF4-FFF2-40B4-BE49-F238E27FC236}">
-                <a16:creationId xmlns:a16="http://schemas.microsoft.com/office/drawing/2014/main" xmlns="" id="{5E294510-31ED-A543-938B-8CF7846E4740}"/>
+                <a16:creationId xmlns:a16="http://schemas.microsoft.com/office/drawing/2014/main" id="{5E294510-31ED-A543-938B-8CF7846E4740}"/>
               </a:ext>
             </a:extLst>
           </p:cNvPr>
@@ -2599,7 +2683,7 @@
           <p:cNvPr id="2" name="Date Placeholder 1">
             <a:extLst>
               <a:ext uri="{FF2B5EF4-FFF2-40B4-BE49-F238E27FC236}">
-                <a16:creationId xmlns:a16="http://schemas.microsoft.com/office/drawing/2014/main" xmlns="" id="{67B9FED5-E769-A047-B151-4EE167E79EBE}"/>
+                <a16:creationId xmlns:a16="http://schemas.microsoft.com/office/drawing/2014/main" id="{67B9FED5-E769-A047-B151-4EE167E79EBE}"/>
               </a:ext>
             </a:extLst>
           </p:cNvPr>
@@ -2628,7 +2712,7 @@
           <p:cNvPr id="3" name="Footer Placeholder 2">
             <a:extLst>
               <a:ext uri="{FF2B5EF4-FFF2-40B4-BE49-F238E27FC236}">
-                <a16:creationId xmlns:a16="http://schemas.microsoft.com/office/drawing/2014/main" xmlns="" id="{822FC704-CD34-614E-9901-77A2B18593FA}"/>
+                <a16:creationId xmlns:a16="http://schemas.microsoft.com/office/drawing/2014/main" id="{822FC704-CD34-614E-9901-77A2B18593FA}"/>
               </a:ext>
             </a:extLst>
           </p:cNvPr>
@@ -2653,7 +2737,7 @@
           <p:cNvPr id="4" name="Slide Number Placeholder 3">
             <a:extLst>
               <a:ext uri="{FF2B5EF4-FFF2-40B4-BE49-F238E27FC236}">
-                <a16:creationId xmlns:a16="http://schemas.microsoft.com/office/drawing/2014/main" xmlns="" id="{578C6DFB-A9C7-BE4A-8010-0780CB83E74A}"/>
+                <a16:creationId xmlns:a16="http://schemas.microsoft.com/office/drawing/2014/main" id="{578C6DFB-A9C7-BE4A-8010-0780CB83E74A}"/>
               </a:ext>
             </a:extLst>
           </p:cNvPr>
@@ -2712,7 +2796,7 @@
           <p:cNvPr id="2" name="Title 1">
             <a:extLst>
               <a:ext uri="{FF2B5EF4-FFF2-40B4-BE49-F238E27FC236}">
-                <a16:creationId xmlns:a16="http://schemas.microsoft.com/office/drawing/2014/main" xmlns="" id="{6496F54F-5C2A-1741-AD6E-DCCBB020B005}"/>
+                <a16:creationId xmlns:a16="http://schemas.microsoft.com/office/drawing/2014/main" id="{6496F54F-5C2A-1741-AD6E-DCCBB020B005}"/>
               </a:ext>
             </a:extLst>
           </p:cNvPr>
@@ -2749,7 +2833,7 @@
           <p:cNvPr id="3" name="Content Placeholder 2">
             <a:extLst>
               <a:ext uri="{FF2B5EF4-FFF2-40B4-BE49-F238E27FC236}">
-                <a16:creationId xmlns:a16="http://schemas.microsoft.com/office/drawing/2014/main" xmlns="" id="{CBCA52CB-7EED-9A42-87CF-290AF13CF29A}"/>
+                <a16:creationId xmlns:a16="http://schemas.microsoft.com/office/drawing/2014/main" id="{CBCA52CB-7EED-9A42-87CF-290AF13CF29A}"/>
               </a:ext>
             </a:extLst>
           </p:cNvPr>
@@ -2839,7 +2923,7 @@
           <p:cNvPr id="4" name="Text Placeholder 3">
             <a:extLst>
               <a:ext uri="{FF2B5EF4-FFF2-40B4-BE49-F238E27FC236}">
-                <a16:creationId xmlns:a16="http://schemas.microsoft.com/office/drawing/2014/main" xmlns="" id="{E1702E7A-FD2F-CB46-94BF-FF2EC9490D6E}"/>
+                <a16:creationId xmlns:a16="http://schemas.microsoft.com/office/drawing/2014/main" id="{E1702E7A-FD2F-CB46-94BF-FF2EC9490D6E}"/>
               </a:ext>
             </a:extLst>
           </p:cNvPr>
@@ -2910,7 +2994,7 @@
           <p:cNvPr id="5" name="Date Placeholder 4">
             <a:extLst>
               <a:ext uri="{FF2B5EF4-FFF2-40B4-BE49-F238E27FC236}">
-                <a16:creationId xmlns:a16="http://schemas.microsoft.com/office/drawing/2014/main" xmlns="" id="{8958105E-9337-A749-8929-C81DA369C8A1}"/>
+                <a16:creationId xmlns:a16="http://schemas.microsoft.com/office/drawing/2014/main" id="{8958105E-9337-A749-8929-C81DA369C8A1}"/>
               </a:ext>
             </a:extLst>
           </p:cNvPr>
@@ -2939,7 +3023,7 @@
           <p:cNvPr id="6" name="Footer Placeholder 5">
             <a:extLst>
               <a:ext uri="{FF2B5EF4-FFF2-40B4-BE49-F238E27FC236}">
-                <a16:creationId xmlns:a16="http://schemas.microsoft.com/office/drawing/2014/main" xmlns="" id="{10081911-6878-5B45-A37C-ACB36ADFD7E1}"/>
+                <a16:creationId xmlns:a16="http://schemas.microsoft.com/office/drawing/2014/main" id="{10081911-6878-5B45-A37C-ACB36ADFD7E1}"/>
               </a:ext>
             </a:extLst>
           </p:cNvPr>
@@ -2964,7 +3048,7 @@
           <p:cNvPr id="7" name="Slide Number Placeholder 6">
             <a:extLst>
               <a:ext uri="{FF2B5EF4-FFF2-40B4-BE49-F238E27FC236}">
-                <a16:creationId xmlns:a16="http://schemas.microsoft.com/office/drawing/2014/main" xmlns="" id="{2AF73ABD-0129-F14E-B86A-51D07AA4CD86}"/>
+                <a16:creationId xmlns:a16="http://schemas.microsoft.com/office/drawing/2014/main" id="{2AF73ABD-0129-F14E-B86A-51D07AA4CD86}"/>
               </a:ext>
             </a:extLst>
           </p:cNvPr>
@@ -3023,7 +3107,7 @@
           <p:cNvPr id="2" name="Title 1">
             <a:extLst>
               <a:ext uri="{FF2B5EF4-FFF2-40B4-BE49-F238E27FC236}">
-                <a16:creationId xmlns:a16="http://schemas.microsoft.com/office/drawing/2014/main" xmlns="" id="{1ADBDC04-624F-4240-A155-7100DB9CDF1F}"/>
+                <a16:creationId xmlns:a16="http://schemas.microsoft.com/office/drawing/2014/main" id="{1ADBDC04-624F-4240-A155-7100DB9CDF1F}"/>
               </a:ext>
             </a:extLst>
           </p:cNvPr>
@@ -3060,7 +3144,7 @@
           <p:cNvPr id="3" name="Picture Placeholder 2">
             <a:extLst>
               <a:ext uri="{FF2B5EF4-FFF2-40B4-BE49-F238E27FC236}">
-                <a16:creationId xmlns:a16="http://schemas.microsoft.com/office/drawing/2014/main" xmlns="" id="{BD9289DE-964C-8043-9669-894C54065FCE}"/>
+                <a16:creationId xmlns:a16="http://schemas.microsoft.com/office/drawing/2014/main" id="{BD9289DE-964C-8043-9669-894C54065FCE}"/>
               </a:ext>
             </a:extLst>
           </p:cNvPr>
@@ -3127,7 +3211,7 @@
           <p:cNvPr id="4" name="Text Placeholder 3">
             <a:extLst>
               <a:ext uri="{FF2B5EF4-FFF2-40B4-BE49-F238E27FC236}">
-                <a16:creationId xmlns:a16="http://schemas.microsoft.com/office/drawing/2014/main" xmlns="" id="{869C1FF4-FD92-7F4A-85CD-FF7136BEC969}"/>
+                <a16:creationId xmlns:a16="http://schemas.microsoft.com/office/drawing/2014/main" id="{869C1FF4-FD92-7F4A-85CD-FF7136BEC969}"/>
               </a:ext>
             </a:extLst>
           </p:cNvPr>
@@ -3198,7 +3282,7 @@
           <p:cNvPr id="5" name="Date Placeholder 4">
             <a:extLst>
               <a:ext uri="{FF2B5EF4-FFF2-40B4-BE49-F238E27FC236}">
-                <a16:creationId xmlns:a16="http://schemas.microsoft.com/office/drawing/2014/main" xmlns="" id="{AE4CC592-934E-3B4A-AE9C-25599CF11B32}"/>
+                <a16:creationId xmlns:a16="http://schemas.microsoft.com/office/drawing/2014/main" id="{AE4CC592-934E-3B4A-AE9C-25599CF11B32}"/>
               </a:ext>
             </a:extLst>
           </p:cNvPr>
@@ -3227,7 +3311,7 @@
           <p:cNvPr id="6" name="Footer Placeholder 5">
             <a:extLst>
               <a:ext uri="{FF2B5EF4-FFF2-40B4-BE49-F238E27FC236}">
-                <a16:creationId xmlns:a16="http://schemas.microsoft.com/office/drawing/2014/main" xmlns="" id="{3C0170A9-8B9F-D448-BA4F-42DC22D5ED6C}"/>
+                <a16:creationId xmlns:a16="http://schemas.microsoft.com/office/drawing/2014/main" id="{3C0170A9-8B9F-D448-BA4F-42DC22D5ED6C}"/>
               </a:ext>
             </a:extLst>
           </p:cNvPr>
@@ -3252,7 +3336,7 @@
           <p:cNvPr id="7" name="Slide Number Placeholder 6">
             <a:extLst>
               <a:ext uri="{FF2B5EF4-FFF2-40B4-BE49-F238E27FC236}">
-                <a16:creationId xmlns:a16="http://schemas.microsoft.com/office/drawing/2014/main" xmlns="" id="{D6313800-A129-844E-B8F0-F74902DD6ACF}"/>
+                <a16:creationId xmlns:a16="http://schemas.microsoft.com/office/drawing/2014/main" id="{D6313800-A129-844E-B8F0-F74902DD6ACF}"/>
               </a:ext>
             </a:extLst>
           </p:cNvPr>
@@ -3316,7 +3400,7 @@
           <p:cNvPr id="2" name="Title Placeholder 1">
             <a:extLst>
               <a:ext uri="{FF2B5EF4-FFF2-40B4-BE49-F238E27FC236}">
-                <a16:creationId xmlns:a16="http://schemas.microsoft.com/office/drawing/2014/main" xmlns="" id="{21B7F7A1-DE46-9245-A6FA-08F1D89789CA}"/>
+                <a16:creationId xmlns:a16="http://schemas.microsoft.com/office/drawing/2014/main" id="{21B7F7A1-DE46-9245-A6FA-08F1D89789CA}"/>
               </a:ext>
             </a:extLst>
           </p:cNvPr>
@@ -3354,7 +3438,7 @@
           <p:cNvPr id="3" name="Text Placeholder 2">
             <a:extLst>
               <a:ext uri="{FF2B5EF4-FFF2-40B4-BE49-F238E27FC236}">
-                <a16:creationId xmlns:a16="http://schemas.microsoft.com/office/drawing/2014/main" xmlns="" id="{8595D4CB-5937-CE41-ABC4-0A4A8A16FF51}"/>
+                <a16:creationId xmlns:a16="http://schemas.microsoft.com/office/drawing/2014/main" id="{8595D4CB-5937-CE41-ABC4-0A4A8A16FF51}"/>
               </a:ext>
             </a:extLst>
           </p:cNvPr>
@@ -3421,7 +3505,7 @@
           <p:cNvPr id="4" name="Date Placeholder 3">
             <a:extLst>
               <a:ext uri="{FF2B5EF4-FFF2-40B4-BE49-F238E27FC236}">
-                <a16:creationId xmlns:a16="http://schemas.microsoft.com/office/drawing/2014/main" xmlns="" id="{05F1C33D-8603-7847-9915-7BF7CF5F9D32}"/>
+                <a16:creationId xmlns:a16="http://schemas.microsoft.com/office/drawing/2014/main" id="{05F1C33D-8603-7847-9915-7BF7CF5F9D32}"/>
               </a:ext>
             </a:extLst>
           </p:cNvPr>
@@ -3468,7 +3552,7 @@
           <p:cNvPr id="5" name="Footer Placeholder 4">
             <a:extLst>
               <a:ext uri="{FF2B5EF4-FFF2-40B4-BE49-F238E27FC236}">
-                <a16:creationId xmlns:a16="http://schemas.microsoft.com/office/drawing/2014/main" xmlns="" id="{1DDFE2EE-C744-6646-AF9E-0CDDD662B2F9}"/>
+                <a16:creationId xmlns:a16="http://schemas.microsoft.com/office/drawing/2014/main" id="{1DDFE2EE-C744-6646-AF9E-0CDDD662B2F9}"/>
               </a:ext>
             </a:extLst>
           </p:cNvPr>
@@ -3511,7 +3595,7 @@
           <p:cNvPr id="6" name="Slide Number Placeholder 5">
             <a:extLst>
               <a:ext uri="{FF2B5EF4-FFF2-40B4-BE49-F238E27FC236}">
-                <a16:creationId xmlns:a16="http://schemas.microsoft.com/office/drawing/2014/main" xmlns="" id="{23020908-4F60-D74E-922D-3F84F22F8041}"/>
+                <a16:creationId xmlns:a16="http://schemas.microsoft.com/office/drawing/2014/main" id="{23020908-4F60-D74E-922D-3F84F22F8041}"/>
               </a:ext>
             </a:extLst>
           </p:cNvPr>
@@ -3879,7 +3963,7 @@
           <p:cNvPr id="2" name="Title 1">
             <a:extLst>
               <a:ext uri="{FF2B5EF4-FFF2-40B4-BE49-F238E27FC236}">
-                <a16:creationId xmlns:a16="http://schemas.microsoft.com/office/drawing/2014/main" xmlns="" id="{FAA89291-60DA-2C40-8096-73810E04757F}"/>
+                <a16:creationId xmlns:a16="http://schemas.microsoft.com/office/drawing/2014/main" id="{FAA89291-60DA-2C40-8096-73810E04757F}"/>
               </a:ext>
             </a:extLst>
           </p:cNvPr>
@@ -3908,7 +3992,7 @@
           <p:cNvPr id="3" name="Subtitle 2">
             <a:extLst>
               <a:ext uri="{FF2B5EF4-FFF2-40B4-BE49-F238E27FC236}">
-                <a16:creationId xmlns:a16="http://schemas.microsoft.com/office/drawing/2014/main" xmlns="" id="{CEB73EAD-9E51-C647-886C-A89700E6F256}"/>
+                <a16:creationId xmlns:a16="http://schemas.microsoft.com/office/drawing/2014/main" id="{CEB73EAD-9E51-C647-886C-A89700E6F256}"/>
               </a:ext>
             </a:extLst>
           </p:cNvPr>
@@ -3952,7 +4036,7 @@
           <p:cNvPr id="5" name="Picture 4">
             <a:extLst>
               <a:ext uri="{FF2B5EF4-FFF2-40B4-BE49-F238E27FC236}">
-                <a16:creationId xmlns:a16="http://schemas.microsoft.com/office/drawing/2014/main" xmlns="" id="{0056138C-987F-684A-938F-5B452E26E6CF}"/>
+                <a16:creationId xmlns:a16="http://schemas.microsoft.com/office/drawing/2014/main" id="{0056138C-987F-684A-938F-5B452E26E6CF}"/>
               </a:ext>
             </a:extLst>
           </p:cNvPr>
@@ -3962,7 +4046,7 @@
           <p:nvPr/>
         </p:nvPicPr>
         <p:blipFill>
-          <a:blip r:embed="rId2"/>
+          <a:blip r:embed="rId3"/>
           <a:stretch>
             <a:fillRect/>
           </a:stretch>
@@ -4012,7 +4096,7 @@
           <p:cNvPr id="2" name="Title 1">
             <a:extLst>
               <a:ext uri="{FF2B5EF4-FFF2-40B4-BE49-F238E27FC236}">
-                <a16:creationId xmlns:a16="http://schemas.microsoft.com/office/drawing/2014/main" xmlns="" id="{AA9F9160-9019-3040-A139-DCC8B1C95273}"/>
+                <a16:creationId xmlns:a16="http://schemas.microsoft.com/office/drawing/2014/main" id="{AA9F9160-9019-3040-A139-DCC8B1C95273}"/>
               </a:ext>
             </a:extLst>
           </p:cNvPr>
@@ -4041,7 +4125,7 @@
           <p:cNvPr id="3" name="Content Placeholder 2">
             <a:extLst>
               <a:ext uri="{FF2B5EF4-FFF2-40B4-BE49-F238E27FC236}">
-                <a16:creationId xmlns:a16="http://schemas.microsoft.com/office/drawing/2014/main" xmlns="" id="{0A31F19A-6F02-B246-85CC-8A5EF661C09D}"/>
+                <a16:creationId xmlns:a16="http://schemas.microsoft.com/office/drawing/2014/main" id="{0A31F19A-6F02-B246-85CC-8A5EF661C09D}"/>
               </a:ext>
             </a:extLst>
           </p:cNvPr>
@@ -4064,11 +4148,7 @@
             </a:pPr>
             <a:r>
               <a:rPr lang="en-US" dirty="0"/>
-              <a:t>Train off previous intervals of </a:t>
-            </a:r>
-            <a:r>
-              <a:rPr lang="en-US" dirty="0" smtClean="0"/>
-              <a:t>data</a:t>
+              <a:t>Train off previous intervals of data</a:t>
             </a:r>
           </a:p>
           <a:p>
@@ -4086,16 +4166,8 @@
               </a:lnSpc>
             </a:pPr>
             <a:r>
-              <a:rPr lang="en-US" dirty="0" smtClean="0"/>
-              <a:t>Predict </a:t>
-            </a:r>
-            <a:r>
-              <a:rPr lang="en-US" dirty="0"/>
-              <a:t>behavior of future </a:t>
-            </a:r>
-            <a:r>
-              <a:rPr lang="en-US" dirty="0" smtClean="0"/>
-              <a:t>data</a:t>
+              <a:rPr lang="en-US" dirty="0"/>
+              <a:t>Predict behavior of future data</a:t>
             </a:r>
           </a:p>
           <a:p>
@@ -4114,13 +4186,8 @@
             </a:pPr>
             <a:r>
               <a:rPr lang="en-US" dirty="0"/>
-              <a:t>Notify users of any </a:t>
-            </a:r>
-            <a:r>
-              <a:rPr lang="en-US" dirty="0" smtClean="0"/>
-              <a:t>anomalies that are anomalous enough to satisfy notification thresholds</a:t>
-            </a:r>
-            <a:endParaRPr lang="en-US" dirty="0"/>
+              <a:t>Notify users of any anomalies that are anomalous enough to satisfy notification thresholds</a:t>
+            </a:r>
           </a:p>
         </p:txBody>
       </p:sp>
@@ -4129,7 +4196,7 @@
           <p:cNvPr id="4" name="Picture 3">
             <a:extLst>
               <a:ext uri="{FF2B5EF4-FFF2-40B4-BE49-F238E27FC236}">
-                <a16:creationId xmlns:a16="http://schemas.microsoft.com/office/drawing/2014/main" xmlns="" id="{E4AEDFE2-2953-F54B-B6FB-1C4BD361B3F7}"/>
+                <a16:creationId xmlns:a16="http://schemas.microsoft.com/office/drawing/2014/main" id="{E4AEDFE2-2953-F54B-B6FB-1C4BD361B3F7}"/>
               </a:ext>
             </a:extLst>
           </p:cNvPr>
@@ -4244,26 +4311,21 @@
             <a:pPr lvl="1"/>
             <a:r>
               <a:rPr lang="en-US" dirty="0"/>
-              <a:t>Custom thresholds for </a:t>
-            </a:r>
-            <a:r>
-              <a:rPr lang="en-US" dirty="0" smtClean="0"/>
-              <a:t>notifications</a:t>
-            </a:r>
-          </a:p>
-          <a:p>
-            <a:r>
-              <a:rPr lang="en-US" dirty="0" smtClean="0"/>
+              <a:t>Custom thresholds for notifications</a:t>
+            </a:r>
+          </a:p>
+          <a:p>
+            <a:r>
+              <a:rPr lang="en-US" dirty="0"/>
               <a:t>Performance constraints</a:t>
             </a:r>
           </a:p>
           <a:p>
             <a:pPr lvl="1"/>
             <a:r>
-              <a:rPr lang="en-US" dirty="0" smtClean="0"/>
+              <a:rPr lang="en-US" dirty="0"/>
               <a:t>Use sampling up to a max number of rows</a:t>
             </a:r>
-            <a:endParaRPr lang="en-US" dirty="0"/>
           </a:p>
           <a:p>
             <a:r>
@@ -4294,7 +4356,7 @@
           <p:cNvPr id="4" name="Picture 3">
             <a:extLst>
               <a:ext uri="{FF2B5EF4-FFF2-40B4-BE49-F238E27FC236}">
-                <a16:creationId xmlns:a16="http://schemas.microsoft.com/office/drawing/2014/main" xmlns="" id="{E4AEDFE2-2953-F54B-B6FB-1C4BD361B3F7}"/>
+                <a16:creationId xmlns:a16="http://schemas.microsoft.com/office/drawing/2014/main" id="{E4AEDFE2-2953-F54B-B6FB-1C4BD361B3F7}"/>
               </a:ext>
             </a:extLst>
           </p:cNvPr>
@@ -4354,7 +4416,7 @@
           <p:cNvPr id="2" name="Title 1">
             <a:extLst>
               <a:ext uri="{FF2B5EF4-FFF2-40B4-BE49-F238E27FC236}">
-                <a16:creationId xmlns:a16="http://schemas.microsoft.com/office/drawing/2014/main" xmlns="" id="{E394CE2A-A9C6-F34F-8952-7B586B7A7598}"/>
+                <a16:creationId xmlns:a16="http://schemas.microsoft.com/office/drawing/2014/main" id="{E394CE2A-A9C6-F34F-8952-7B586B7A7598}"/>
               </a:ext>
             </a:extLst>
           </p:cNvPr>
@@ -4383,7 +4445,7 @@
           <p:cNvPr id="4" name="Picture 3">
             <a:extLst>
               <a:ext uri="{FF2B5EF4-FFF2-40B4-BE49-F238E27FC236}">
-                <a16:creationId xmlns:a16="http://schemas.microsoft.com/office/drawing/2014/main" xmlns="" id="{700EA7AA-F650-334A-956C-0AB6D3D51848}"/>
+                <a16:creationId xmlns:a16="http://schemas.microsoft.com/office/drawing/2014/main" id="{700EA7AA-F650-334A-956C-0AB6D3D51848}"/>
               </a:ext>
             </a:extLst>
           </p:cNvPr>
@@ -4478,7 +4540,15 @@
           <a:p>
             <a:r>
               <a:rPr lang="en-US" dirty="0"/>
-              <a:t>Treat the column being null/ as a Bernoulli Trial</a:t>
+              <a:t>Treat the column </a:t>
+            </a:r>
+            <a:r>
+              <a:rPr lang="en-US"/>
+              <a:t>being null </a:t>
+            </a:r>
+            <a:r>
+              <a:rPr lang="en-US" dirty="0"/>
+              <a:t>as a Bernoulli Trial</a:t>
             </a:r>
           </a:p>
           <a:p>
@@ -4520,7 +4590,7 @@
           <p:cNvPr id="4" name="Picture 3">
             <a:extLst>
               <a:ext uri="{FF2B5EF4-FFF2-40B4-BE49-F238E27FC236}">
-                <a16:creationId xmlns:a16="http://schemas.microsoft.com/office/drawing/2014/main" xmlns="" id="{E4AEDFE2-2953-F54B-B6FB-1C4BD361B3F7}"/>
+                <a16:creationId xmlns:a16="http://schemas.microsoft.com/office/drawing/2014/main" id="{E4AEDFE2-2953-F54B-B6FB-1C4BD361B3F7}"/>
               </a:ext>
             </a:extLst>
           </p:cNvPr>
@@ -4702,7 +4772,7 @@
           <p:cNvPr id="4" name="Picture 3">
             <a:extLst>
               <a:ext uri="{FF2B5EF4-FFF2-40B4-BE49-F238E27FC236}">
-                <a16:creationId xmlns:a16="http://schemas.microsoft.com/office/drawing/2014/main" xmlns="" id="{E4AEDFE2-2953-F54B-B6FB-1C4BD361B3F7}"/>
+                <a16:creationId xmlns:a16="http://schemas.microsoft.com/office/drawing/2014/main" id="{E4AEDFE2-2953-F54B-B6FB-1C4BD361B3F7}"/>
               </a:ext>
             </a:extLst>
           </p:cNvPr>
@@ -4889,7 +4959,7 @@
           <p:cNvPr id="4" name="Picture 3">
             <a:extLst>
               <a:ext uri="{FF2B5EF4-FFF2-40B4-BE49-F238E27FC236}">
-                <a16:creationId xmlns:a16="http://schemas.microsoft.com/office/drawing/2014/main" xmlns="" id="{E4AEDFE2-2953-F54B-B6FB-1C4BD361B3F7}"/>
+                <a16:creationId xmlns:a16="http://schemas.microsoft.com/office/drawing/2014/main" id="{E4AEDFE2-2953-F54B-B6FB-1C4BD361B3F7}"/>
               </a:ext>
             </a:extLst>
           </p:cNvPr>
@@ -4949,7 +5019,7 @@
           <p:cNvPr id="2" name="Title 1">
             <a:extLst>
               <a:ext uri="{FF2B5EF4-FFF2-40B4-BE49-F238E27FC236}">
-                <a16:creationId xmlns:a16="http://schemas.microsoft.com/office/drawing/2014/main" xmlns="" id="{735D7AA6-1425-8C4F-8608-265E01867490}"/>
+                <a16:creationId xmlns:a16="http://schemas.microsoft.com/office/drawing/2014/main" id="{735D7AA6-1425-8C4F-8608-265E01867490}"/>
               </a:ext>
             </a:extLst>
           </p:cNvPr>
@@ -4978,7 +5048,7 @@
           <p:cNvPr id="3" name="Content Placeholder 2">
             <a:extLst>
               <a:ext uri="{FF2B5EF4-FFF2-40B4-BE49-F238E27FC236}">
-                <a16:creationId xmlns:a16="http://schemas.microsoft.com/office/drawing/2014/main" xmlns="" id="{31882B9E-E7C2-C443-B3BB-E435A2E6804C}"/>
+                <a16:creationId xmlns:a16="http://schemas.microsoft.com/office/drawing/2014/main" id="{31882B9E-E7C2-C443-B3BB-E435A2E6804C}"/>
               </a:ext>
             </a:extLst>
           </p:cNvPr>
@@ -5052,7 +5122,7 @@
           <p:cNvPr id="4" name="Picture 3">
             <a:extLst>
               <a:ext uri="{FF2B5EF4-FFF2-40B4-BE49-F238E27FC236}">
-                <a16:creationId xmlns:a16="http://schemas.microsoft.com/office/drawing/2014/main" xmlns="" id="{A196DAC0-1739-7B42-AB81-828E29C6B021}"/>
+                <a16:creationId xmlns:a16="http://schemas.microsoft.com/office/drawing/2014/main" id="{A196DAC0-1739-7B42-AB81-828E29C6B021}"/>
               </a:ext>
             </a:extLst>
           </p:cNvPr>
@@ -5112,7 +5182,7 @@
           <p:cNvPr id="2" name="Title 1">
             <a:extLst>
               <a:ext uri="{FF2B5EF4-FFF2-40B4-BE49-F238E27FC236}">
-                <a16:creationId xmlns:a16="http://schemas.microsoft.com/office/drawing/2014/main" xmlns="" id="{2841A013-1902-0A4D-9383-F3238305A7C5}"/>
+                <a16:creationId xmlns:a16="http://schemas.microsoft.com/office/drawing/2014/main" id="{2841A013-1902-0A4D-9383-F3238305A7C5}"/>
               </a:ext>
             </a:extLst>
           </p:cNvPr>
@@ -5141,7 +5211,7 @@
           <p:cNvPr id="3" name="Content Placeholder 2">
             <a:extLst>
               <a:ext uri="{FF2B5EF4-FFF2-40B4-BE49-F238E27FC236}">
-                <a16:creationId xmlns:a16="http://schemas.microsoft.com/office/drawing/2014/main" xmlns="" id="{D8AC1DFA-2A83-E54D-B67B-E20F3EA39F94}"/>
+                <a16:creationId xmlns:a16="http://schemas.microsoft.com/office/drawing/2014/main" id="{D8AC1DFA-2A83-E54D-B67B-E20F3EA39F94}"/>
               </a:ext>
             </a:extLst>
           </p:cNvPr>
@@ -5163,7 +5233,7 @@
               </a:lnSpc>
             </a:pPr>
             <a:r>
-              <a:rPr lang="en-US" dirty="0" smtClean="0"/>
+              <a:rPr lang="en-US" dirty="0"/>
               <a:t>Companies with large amounts of data consolidated in a handful of important tables</a:t>
             </a:r>
           </a:p>
@@ -5174,7 +5244,7 @@
               </a:lnSpc>
             </a:pPr>
             <a:r>
-              <a:rPr lang="en-US" dirty="0" smtClean="0"/>
+              <a:rPr lang="en-US" dirty="0"/>
               <a:t>Small-to-medium sized (not large enough to have dedicated data quality teams)</a:t>
             </a:r>
           </a:p>
@@ -5185,7 +5255,7 @@
               </a:lnSpc>
             </a:pPr>
             <a:r>
-              <a:rPr lang="en-US" dirty="0" smtClean="0"/>
+              <a:rPr lang="en-US" dirty="0"/>
               <a:t>Data Engineers</a:t>
             </a:r>
           </a:p>
@@ -5196,10 +5266,9 @@
               </a:lnSpc>
             </a:pPr>
             <a:r>
-              <a:rPr lang="en-US" dirty="0" smtClean="0"/>
+              <a:rPr lang="en-US" dirty="0"/>
               <a:t>Example use cases:</a:t>
             </a:r>
-            <a:endParaRPr lang="en-US" dirty="0"/>
           </a:p>
           <a:p>
             <a:pPr>
@@ -5216,7 +5285,7 @@
           <p:cNvPr id="4" name="Picture 3">
             <a:extLst>
               <a:ext uri="{FF2B5EF4-FFF2-40B4-BE49-F238E27FC236}">
-                <a16:creationId xmlns:a16="http://schemas.microsoft.com/office/drawing/2014/main" xmlns="" id="{EFE81110-E345-0A4A-B78E-9AD34187D73F}"/>
+                <a16:creationId xmlns:a16="http://schemas.microsoft.com/office/drawing/2014/main" id="{EFE81110-E345-0A4A-B78E-9AD34187D73F}"/>
               </a:ext>
             </a:extLst>
           </p:cNvPr>
@@ -5246,7 +5315,7 @@
           <p:cNvPr id="6" name="Picture 5">
             <a:extLst>
               <a:ext uri="{FF2B5EF4-FFF2-40B4-BE49-F238E27FC236}">
-                <a16:creationId xmlns:a16="http://schemas.microsoft.com/office/drawing/2014/main" xmlns="" id="{C33F4CFD-AAF0-784F-8D1A-AEFC1C5E590D}"/>
+                <a16:creationId xmlns:a16="http://schemas.microsoft.com/office/drawing/2014/main" id="{C33F4CFD-AAF0-784F-8D1A-AEFC1C5E590D}"/>
               </a:ext>
             </a:extLst>
           </p:cNvPr>
@@ -5276,7 +5345,7 @@
           <p:cNvPr id="10" name="Picture 9">
             <a:extLst>
               <a:ext uri="{FF2B5EF4-FFF2-40B4-BE49-F238E27FC236}">
-                <a16:creationId xmlns:a16="http://schemas.microsoft.com/office/drawing/2014/main" xmlns="" id="{2D375751-A7E1-0648-A61D-70EF4E727BC8}"/>
+                <a16:creationId xmlns:a16="http://schemas.microsoft.com/office/drawing/2014/main" id="{2D375751-A7E1-0648-A61D-70EF4E727BC8}"/>
               </a:ext>
             </a:extLst>
           </p:cNvPr>
@@ -5348,10 +5417,9 @@
           <a:p>
             <a:pPr algn="ctr"/>
             <a:r>
-              <a:rPr lang="en-US" dirty="0" smtClean="0"/>
+              <a:rPr lang="en-US" dirty="0"/>
               <a:t>How data quality checking currently works</a:t>
             </a:r>
-            <a:endParaRPr lang="en-US" dirty="0"/>
           </a:p>
         </p:txBody>
       </p:sp>
@@ -5371,21 +5439,21 @@
           <a:lstStyle/>
           <a:p>
             <a:r>
-              <a:rPr lang="en-US" dirty="0" smtClean="0"/>
+              <a:rPr lang="en-US" dirty="0"/>
               <a:t>Rule engines</a:t>
             </a:r>
           </a:p>
           <a:p>
             <a:pPr lvl="1"/>
             <a:r>
-              <a:rPr lang="en-US" dirty="0" smtClean="0"/>
+              <a:rPr lang="en-US" dirty="0"/>
               <a:t>Just like tests, hard to get engineers to consistently write good rules</a:t>
             </a:r>
           </a:p>
           <a:p>
             <a:pPr lvl="1"/>
             <a:r>
-              <a:rPr lang="en-US" dirty="0" smtClean="0"/>
+              <a:rPr lang="en-US" dirty="0"/>
               <a:t>Evolving data makes this difficult</a:t>
             </a:r>
           </a:p>
@@ -5395,23 +5463,53 @@
           </a:p>
           <a:p>
             <a:pPr lvl="1"/>
-            <a:endParaRPr lang="en-US" dirty="0" smtClean="0"/>
-          </a:p>
-          <a:p>
-            <a:r>
-              <a:rPr lang="en-US" dirty="0" smtClean="0"/>
+            <a:endParaRPr lang="en-US" dirty="0"/>
+          </a:p>
+          <a:p>
+            <a:r>
+              <a:rPr lang="en-US" dirty="0"/>
               <a:t>Anomaly Detection</a:t>
             </a:r>
           </a:p>
           <a:p>
             <a:pPr lvl="1"/>
             <a:r>
-              <a:rPr lang="en-US" dirty="0" smtClean="0"/>
+              <a:rPr lang="en-US" dirty="0"/>
               <a:t>Most solutions are very noisy and tend to get ignored</a:t>
             </a:r>
           </a:p>
         </p:txBody>
       </p:sp>
+      <p:pic>
+        <p:nvPicPr>
+          <p:cNvPr id="4" name="Picture 3">
+            <a:extLst>
+              <a:ext uri="{FF2B5EF4-FFF2-40B4-BE49-F238E27FC236}">
+                <a16:creationId xmlns:a16="http://schemas.microsoft.com/office/drawing/2014/main" id="{EFDEDE13-6A12-704A-AB3D-110B7E49DF53}"/>
+              </a:ext>
+            </a:extLst>
+          </p:cNvPr>
+          <p:cNvPicPr>
+            <a:picLocks noChangeAspect="1"/>
+          </p:cNvPicPr>
+          <p:nvPr/>
+        </p:nvPicPr>
+        <p:blipFill>
+          <a:blip r:embed="rId2"/>
+          <a:stretch>
+            <a:fillRect/>
+          </a:stretch>
+        </p:blipFill>
+        <p:spPr>
+          <a:xfrm>
+            <a:off x="10642600" y="5308600"/>
+            <a:ext cx="1549400" cy="1549400"/>
+          </a:xfrm>
+          <a:prstGeom prst="rect">
+            <a:avLst/>
+          </a:prstGeom>
+        </p:spPr>
+      </p:pic>
     </p:spTree>
     <p:extLst>
       <p:ext uri="{BB962C8B-B14F-4D97-AF65-F5344CB8AC3E}">
@@ -5447,7 +5545,7 @@
           <p:cNvPr id="2" name="Title 1">
             <a:extLst>
               <a:ext uri="{FF2B5EF4-FFF2-40B4-BE49-F238E27FC236}">
-                <a16:creationId xmlns:a16="http://schemas.microsoft.com/office/drawing/2014/main" xmlns="" id="{2841A013-1902-0A4D-9383-F3238305A7C5}"/>
+                <a16:creationId xmlns:a16="http://schemas.microsoft.com/office/drawing/2014/main" id="{2841A013-1902-0A4D-9383-F3238305A7C5}"/>
               </a:ext>
             </a:extLst>
           </p:cNvPr>
@@ -5476,7 +5574,7 @@
           <p:cNvPr id="3" name="Content Placeholder 2">
             <a:extLst>
               <a:ext uri="{FF2B5EF4-FFF2-40B4-BE49-F238E27FC236}">
-                <a16:creationId xmlns:a16="http://schemas.microsoft.com/office/drawing/2014/main" xmlns="" id="{D8AC1DFA-2A83-E54D-B67B-E20F3EA39F94}"/>
+                <a16:creationId xmlns:a16="http://schemas.microsoft.com/office/drawing/2014/main" id="{D8AC1DFA-2A83-E54D-B67B-E20F3EA39F94}"/>
               </a:ext>
             </a:extLst>
           </p:cNvPr>
@@ -5536,7 +5634,7 @@
           <p:cNvPr id="4" name="Picture 3">
             <a:extLst>
               <a:ext uri="{FF2B5EF4-FFF2-40B4-BE49-F238E27FC236}">
-                <a16:creationId xmlns:a16="http://schemas.microsoft.com/office/drawing/2014/main" xmlns="" id="{EFE81110-E345-0A4A-B78E-9AD34187D73F}"/>
+                <a16:creationId xmlns:a16="http://schemas.microsoft.com/office/drawing/2014/main" id="{EFE81110-E345-0A4A-B78E-9AD34187D73F}"/>
               </a:ext>
             </a:extLst>
           </p:cNvPr>
@@ -5596,7 +5694,7 @@
           <p:cNvPr id="2" name="Title 1">
             <a:extLst>
               <a:ext uri="{FF2B5EF4-FFF2-40B4-BE49-F238E27FC236}">
-                <a16:creationId xmlns:a16="http://schemas.microsoft.com/office/drawing/2014/main" xmlns="" id="{2841A013-1902-0A4D-9383-F3238305A7C5}"/>
+                <a16:creationId xmlns:a16="http://schemas.microsoft.com/office/drawing/2014/main" id="{2841A013-1902-0A4D-9383-F3238305A7C5}"/>
               </a:ext>
             </a:extLst>
           </p:cNvPr>
@@ -5625,7 +5723,7 @@
           <p:cNvPr id="3" name="Content Placeholder 2">
             <a:extLst>
               <a:ext uri="{FF2B5EF4-FFF2-40B4-BE49-F238E27FC236}">
-                <a16:creationId xmlns:a16="http://schemas.microsoft.com/office/drawing/2014/main" xmlns="" id="{D8AC1DFA-2A83-E54D-B67B-E20F3EA39F94}"/>
+                <a16:creationId xmlns:a16="http://schemas.microsoft.com/office/drawing/2014/main" id="{D8AC1DFA-2A83-E54D-B67B-E20F3EA39F94}"/>
               </a:ext>
             </a:extLst>
           </p:cNvPr>
@@ -5747,7 +5845,7 @@
           <p:cNvPr id="4" name="Picture 3">
             <a:extLst>
               <a:ext uri="{FF2B5EF4-FFF2-40B4-BE49-F238E27FC236}">
-                <a16:creationId xmlns:a16="http://schemas.microsoft.com/office/drawing/2014/main" xmlns="" id="{EFE81110-E345-0A4A-B78E-9AD34187D73F}"/>
+                <a16:creationId xmlns:a16="http://schemas.microsoft.com/office/drawing/2014/main" id="{EFE81110-E345-0A4A-B78E-9AD34187D73F}"/>
               </a:ext>
             </a:extLst>
           </p:cNvPr>
@@ -5890,7 +5988,7 @@
           <p:cNvPr id="4" name="Picture 3">
             <a:extLst>
               <a:ext uri="{FF2B5EF4-FFF2-40B4-BE49-F238E27FC236}">
-                <a16:creationId xmlns:a16="http://schemas.microsoft.com/office/drawing/2014/main" xmlns="" id="{E4AEDFE2-2953-F54B-B6FB-1C4BD361B3F7}"/>
+                <a16:creationId xmlns:a16="http://schemas.microsoft.com/office/drawing/2014/main" id="{E4AEDFE2-2953-F54B-B6FB-1C4BD361B3F7}"/>
               </a:ext>
             </a:extLst>
           </p:cNvPr>
@@ -6231,7 +6329,7 @@
           <p:cNvPr id="2" name="Title 1">
             <a:extLst>
               <a:ext uri="{FF2B5EF4-FFF2-40B4-BE49-F238E27FC236}">
-                <a16:creationId xmlns:a16="http://schemas.microsoft.com/office/drawing/2014/main" xmlns="" id="{80650A49-BE78-CB47-87F4-137D78D89344}"/>
+                <a16:creationId xmlns:a16="http://schemas.microsoft.com/office/drawing/2014/main" id="{80650A49-BE78-CB47-87F4-137D78D89344}"/>
               </a:ext>
             </a:extLst>
           </p:cNvPr>
@@ -6260,7 +6358,7 @@
           <p:cNvPr id="3" name="Content Placeholder 2">
             <a:extLst>
               <a:ext uri="{FF2B5EF4-FFF2-40B4-BE49-F238E27FC236}">
-                <a16:creationId xmlns:a16="http://schemas.microsoft.com/office/drawing/2014/main" xmlns="" id="{5F5DC835-9939-6F45-AF4A-B6B80623ED1D}"/>
+                <a16:creationId xmlns:a16="http://schemas.microsoft.com/office/drawing/2014/main" id="{5F5DC835-9939-6F45-AF4A-B6B80623ED1D}"/>
               </a:ext>
             </a:extLst>
           </p:cNvPr>
@@ -6326,7 +6424,7 @@
           <p:cNvPr id="4" name="Picture 3">
             <a:extLst>
               <a:ext uri="{FF2B5EF4-FFF2-40B4-BE49-F238E27FC236}">
-                <a16:creationId xmlns:a16="http://schemas.microsoft.com/office/drawing/2014/main" xmlns="" id="{9008AD4F-484B-8040-B237-4A4DE7B0EA8E}"/>
+                <a16:creationId xmlns:a16="http://schemas.microsoft.com/office/drawing/2014/main" id="{9008AD4F-484B-8040-B237-4A4DE7B0EA8E}"/>
               </a:ext>
             </a:extLst>
           </p:cNvPr>
@@ -6386,7 +6484,7 @@
           <p:cNvPr id="2" name="Title 1">
             <a:extLst>
               <a:ext uri="{FF2B5EF4-FFF2-40B4-BE49-F238E27FC236}">
-                <a16:creationId xmlns:a16="http://schemas.microsoft.com/office/drawing/2014/main" xmlns="" id="{BC5DA4AD-0C71-7A47-85DE-BC9DE15B285A}"/>
+                <a16:creationId xmlns:a16="http://schemas.microsoft.com/office/drawing/2014/main" id="{BC5DA4AD-0C71-7A47-85DE-BC9DE15B285A}"/>
               </a:ext>
             </a:extLst>
           </p:cNvPr>
@@ -6415,7 +6513,7 @@
           <p:cNvPr id="3" name="Content Placeholder 2">
             <a:extLst>
               <a:ext uri="{FF2B5EF4-FFF2-40B4-BE49-F238E27FC236}">
-                <a16:creationId xmlns:a16="http://schemas.microsoft.com/office/drawing/2014/main" xmlns="" id="{DFEB92B7-8F82-E449-A4BC-7E38092C7E34}"/>
+                <a16:creationId xmlns:a16="http://schemas.microsoft.com/office/drawing/2014/main" id="{DFEB92B7-8F82-E449-A4BC-7E38092C7E34}"/>
               </a:ext>
             </a:extLst>
           </p:cNvPr>
@@ -6476,7 +6574,7 @@
           <p:cNvPr id="4" name="Picture 3">
             <a:extLst>
               <a:ext uri="{FF2B5EF4-FFF2-40B4-BE49-F238E27FC236}">
-                <a16:creationId xmlns:a16="http://schemas.microsoft.com/office/drawing/2014/main" xmlns="" id="{1DB5F070-954F-B246-92C2-DBBAF1318929}"/>
+                <a16:creationId xmlns:a16="http://schemas.microsoft.com/office/drawing/2014/main" id="{1DB5F070-954F-B246-92C2-DBBAF1318929}"/>
               </a:ext>
             </a:extLst>
           </p:cNvPr>

</xml_diff>